<commit_message>
docs: updated UML Diagrams & Sequence Diagrams to accurately illustrate the Register & Login features
</commit_message>
<xml_diff>
--- a/docs/diagrams/SDforLoginCommandLogicAndModel.pptx
+++ b/docs/diagrams/SDforLoginCommandLogicAndModel.pptx
@@ -261,7 +261,7 @@
           <a:p>
             <a:fld id="{7A26E73D-0704-41E2-A85C-9874C6C723E6}" type="datetimeFigureOut">
               <a:rPr lang="en-IN" smtClean="0"/>
-              <a:t>14-10-2018</a:t>
+              <a:t>16-10-2018</a:t>
             </a:fld>
             <a:endParaRPr lang="en-IN"/>
           </a:p>
@@ -461,7 +461,7 @@
           <a:p>
             <a:fld id="{7A26E73D-0704-41E2-A85C-9874C6C723E6}" type="datetimeFigureOut">
               <a:rPr lang="en-IN" smtClean="0"/>
-              <a:t>14-10-2018</a:t>
+              <a:t>16-10-2018</a:t>
             </a:fld>
             <a:endParaRPr lang="en-IN"/>
           </a:p>
@@ -671,7 +671,7 @@
           <a:p>
             <a:fld id="{7A26E73D-0704-41E2-A85C-9874C6C723E6}" type="datetimeFigureOut">
               <a:rPr lang="en-IN" smtClean="0"/>
-              <a:t>14-10-2018</a:t>
+              <a:t>16-10-2018</a:t>
             </a:fld>
             <a:endParaRPr lang="en-IN"/>
           </a:p>
@@ -871,7 +871,7 @@
           <a:p>
             <a:fld id="{7A26E73D-0704-41E2-A85C-9874C6C723E6}" type="datetimeFigureOut">
               <a:rPr lang="en-IN" smtClean="0"/>
-              <a:t>14-10-2018</a:t>
+              <a:t>16-10-2018</a:t>
             </a:fld>
             <a:endParaRPr lang="en-IN"/>
           </a:p>
@@ -1147,7 +1147,7 @@
           <a:p>
             <a:fld id="{7A26E73D-0704-41E2-A85C-9874C6C723E6}" type="datetimeFigureOut">
               <a:rPr lang="en-IN" smtClean="0"/>
-              <a:t>14-10-2018</a:t>
+              <a:t>16-10-2018</a:t>
             </a:fld>
             <a:endParaRPr lang="en-IN"/>
           </a:p>
@@ -1415,7 +1415,7 @@
           <a:p>
             <a:fld id="{7A26E73D-0704-41E2-A85C-9874C6C723E6}" type="datetimeFigureOut">
               <a:rPr lang="en-IN" smtClean="0"/>
-              <a:t>14-10-2018</a:t>
+              <a:t>16-10-2018</a:t>
             </a:fld>
             <a:endParaRPr lang="en-IN"/>
           </a:p>
@@ -1830,7 +1830,7 @@
           <a:p>
             <a:fld id="{7A26E73D-0704-41E2-A85C-9874C6C723E6}" type="datetimeFigureOut">
               <a:rPr lang="en-IN" smtClean="0"/>
-              <a:t>14-10-2018</a:t>
+              <a:t>16-10-2018</a:t>
             </a:fld>
             <a:endParaRPr lang="en-IN"/>
           </a:p>
@@ -1972,7 +1972,7 @@
           <a:p>
             <a:fld id="{7A26E73D-0704-41E2-A85C-9874C6C723E6}" type="datetimeFigureOut">
               <a:rPr lang="en-IN" smtClean="0"/>
-              <a:t>14-10-2018</a:t>
+              <a:t>16-10-2018</a:t>
             </a:fld>
             <a:endParaRPr lang="en-IN"/>
           </a:p>
@@ -2085,7 +2085,7 @@
           <a:p>
             <a:fld id="{7A26E73D-0704-41E2-A85C-9874C6C723E6}" type="datetimeFigureOut">
               <a:rPr lang="en-IN" smtClean="0"/>
-              <a:t>14-10-2018</a:t>
+              <a:t>16-10-2018</a:t>
             </a:fld>
             <a:endParaRPr lang="en-IN"/>
           </a:p>
@@ -2398,7 +2398,7 @@
           <a:p>
             <a:fld id="{7A26E73D-0704-41E2-A85C-9874C6C723E6}" type="datetimeFigureOut">
               <a:rPr lang="en-IN" smtClean="0"/>
-              <a:t>14-10-2018</a:t>
+              <a:t>16-10-2018</a:t>
             </a:fld>
             <a:endParaRPr lang="en-IN"/>
           </a:p>
@@ -2687,7 +2687,7 @@
           <a:p>
             <a:fld id="{7A26E73D-0704-41E2-A85C-9874C6C723E6}" type="datetimeFigureOut">
               <a:rPr lang="en-IN" smtClean="0"/>
-              <a:t>14-10-2018</a:t>
+              <a:t>16-10-2018</a:t>
             </a:fld>
             <a:endParaRPr lang="en-IN"/>
           </a:p>
@@ -2930,7 +2930,7 @@
           <a:p>
             <a:fld id="{7A26E73D-0704-41E2-A85C-9874C6C723E6}" type="datetimeFigureOut">
               <a:rPr lang="en-IN" smtClean="0"/>
-              <a:t>14-10-2018</a:t>
+              <a:t>16-10-2018</a:t>
             </a:fld>
             <a:endParaRPr lang="en-IN"/>
           </a:p>
@@ -3361,7 +3361,7 @@
         </p:nvSpPr>
         <p:spPr>
           <a:xfrm>
-            <a:off x="2153873" y="1268766"/>
+            <a:off x="1885425" y="169808"/>
             <a:ext cx="7580089" cy="4320467"/>
           </a:xfrm>
           <a:prstGeom prst="roundRect">
@@ -3428,7 +3428,7 @@
         </p:nvSpPr>
         <p:spPr>
           <a:xfrm>
-            <a:off x="2313118" y="1904293"/>
+            <a:off x="2044670" y="805335"/>
             <a:ext cx="1455629" cy="346760"/>
           </a:xfrm>
           <a:prstGeom prst="rect">
@@ -3501,7 +3501,7 @@
         </p:nvCxnSpPr>
         <p:spPr>
           <a:xfrm>
-            <a:off x="3040932" y="2267964"/>
+            <a:off x="2772484" y="1169006"/>
             <a:ext cx="0" cy="2597583"/>
           </a:xfrm>
           <a:prstGeom prst="line">
@@ -3544,7 +3544,7 @@
         </p:nvSpPr>
         <p:spPr>
           <a:xfrm>
-            <a:off x="2968924" y="2618658"/>
+            <a:off x="2700476" y="1519700"/>
             <a:ext cx="152400" cy="2780287"/>
           </a:xfrm>
           <a:prstGeom prst="rect">
@@ -3597,7 +3597,7 @@
         </p:nvSpPr>
         <p:spPr>
           <a:xfrm>
-            <a:off x="4211273" y="1787056"/>
+            <a:off x="3942825" y="688098"/>
             <a:ext cx="1219200" cy="467684"/>
           </a:xfrm>
           <a:prstGeom prst="rect">
@@ -3685,7 +3685,7 @@
         </p:nvCxnSpPr>
         <p:spPr>
           <a:xfrm>
-            <a:off x="4824672" y="2271651"/>
+            <a:off x="4556224" y="1172693"/>
             <a:ext cx="0" cy="1695374"/>
           </a:xfrm>
           <a:prstGeom prst="line">
@@ -3728,7 +3728,7 @@
         </p:nvSpPr>
         <p:spPr>
           <a:xfrm>
-            <a:off x="4752663" y="2729843"/>
+            <a:off x="4484215" y="1630885"/>
             <a:ext cx="174929" cy="1129459"/>
           </a:xfrm>
           <a:prstGeom prst="rect">
@@ -3785,7 +3785,7 @@
         </p:nvSpPr>
         <p:spPr>
           <a:xfrm>
-            <a:off x="7689638" y="2844986"/>
+            <a:off x="7421190" y="1746028"/>
             <a:ext cx="1093635" cy="461538"/>
           </a:xfrm>
           <a:prstGeom prst="rect">
@@ -3863,7 +3863,7 @@
         </p:nvCxnSpPr>
         <p:spPr>
           <a:xfrm>
-            <a:off x="8240647" y="3310680"/>
+            <a:off x="7972199" y="2211722"/>
             <a:ext cx="0" cy="1928177"/>
           </a:xfrm>
           <a:prstGeom prst="line">
@@ -3906,7 +3906,7 @@
         </p:nvSpPr>
         <p:spPr>
           <a:xfrm>
-            <a:off x="8164447" y="3310680"/>
+            <a:off x="7895999" y="2211722"/>
             <a:ext cx="152400" cy="250912"/>
           </a:xfrm>
           <a:prstGeom prst="rect">
@@ -3959,7 +3959,7 @@
         </p:nvCxnSpPr>
         <p:spPr>
           <a:xfrm>
-            <a:off x="1849073" y="2622346"/>
+            <a:off x="1580625" y="1523388"/>
             <a:ext cx="1119851" cy="0"/>
           </a:xfrm>
           <a:prstGeom prst="straightConnector1">
@@ -4001,7 +4001,7 @@
         </p:nvCxnSpPr>
         <p:spPr>
           <a:xfrm flipV="1">
-            <a:off x="3121324" y="2729844"/>
+            <a:off x="2852876" y="1630886"/>
             <a:ext cx="1596514" cy="1"/>
           </a:xfrm>
           <a:prstGeom prst="straightConnector1">
@@ -4043,7 +4043,7 @@
         </p:nvCxnSpPr>
         <p:spPr>
           <a:xfrm flipV="1">
-            <a:off x="6679172" y="3310961"/>
+            <a:off x="6410724" y="2212003"/>
             <a:ext cx="1014631" cy="1"/>
           </a:xfrm>
           <a:prstGeom prst="straightConnector1">
@@ -4085,7 +4085,7 @@
         </p:nvSpPr>
         <p:spPr>
           <a:xfrm>
-            <a:off x="5499152" y="4236808"/>
+            <a:off x="5343581" y="3218839"/>
             <a:ext cx="855809" cy="215444"/>
           </a:xfrm>
           <a:prstGeom prst="rect">
@@ -4131,7 +4131,7 @@
         </p:nvCxnSpPr>
         <p:spPr>
           <a:xfrm>
-            <a:off x="6725873" y="3532193"/>
+            <a:off x="6457425" y="2433235"/>
             <a:ext cx="1492974" cy="0"/>
           </a:xfrm>
           <a:prstGeom prst="straightConnector1">
@@ -4175,7 +4175,7 @@
         </p:nvCxnSpPr>
         <p:spPr>
           <a:xfrm flipV="1">
-            <a:off x="3138259" y="3850978"/>
+            <a:off x="2869811" y="2752020"/>
             <a:ext cx="1596514" cy="5378"/>
           </a:xfrm>
           <a:prstGeom prst="straightConnector1">
@@ -4219,7 +4219,7 @@
         </p:nvSpPr>
         <p:spPr>
           <a:xfrm>
-            <a:off x="9733969" y="1969947"/>
+            <a:off x="9465521" y="870989"/>
             <a:ext cx="1030504" cy="346760"/>
           </a:xfrm>
           <a:prstGeom prst="rect">
@@ -4270,48 +4270,6 @@
           </a:p>
         </p:txBody>
       </p:sp>
-      <p:cxnSp>
-        <p:nvCxnSpPr>
-          <p:cNvPr id="21" name="Straight Arrow Connector 20">
-            <a:extLst>
-              <a:ext uri="{FF2B5EF4-FFF2-40B4-BE49-F238E27FC236}">
-                <a16:creationId xmlns:a16="http://schemas.microsoft.com/office/drawing/2014/main" id="{4FE2C9F4-5D80-497E-8392-935B22E5D8BF}"/>
-              </a:ext>
-            </a:extLst>
-          </p:cNvPr>
-          <p:cNvCxnSpPr/>
-          <p:nvPr/>
-        </p:nvCxnSpPr>
-        <p:spPr>
-          <a:xfrm>
-            <a:off x="3121324" y="4472180"/>
-            <a:ext cx="5043123" cy="0"/>
-          </a:xfrm>
-          <a:prstGeom prst="straightConnector1">
-            <a:avLst/>
-          </a:prstGeom>
-          <a:ln w="19050">
-            <a:solidFill>
-              <a:srgbClr val="0070C0"/>
-            </a:solidFill>
-            <a:tailEnd type="arrow"/>
-          </a:ln>
-        </p:spPr>
-        <p:style>
-          <a:lnRef idx="1">
-            <a:schemeClr val="accent1"/>
-          </a:lnRef>
-          <a:fillRef idx="0">
-            <a:schemeClr val="accent1"/>
-          </a:fillRef>
-          <a:effectRef idx="0">
-            <a:schemeClr val="accent1"/>
-          </a:effectRef>
-          <a:fontRef idx="minor">
-            <a:schemeClr val="tx1"/>
-          </a:fontRef>
-        </p:style>
-      </p:cxnSp>
       <p:sp>
         <p:nvSpPr>
           <p:cNvPr id="22" name="Rectangle 21">
@@ -4326,7 +4284,7 @@
         </p:nvSpPr>
         <p:spPr>
           <a:xfrm>
-            <a:off x="8155525" y="3662027"/>
+            <a:off x="7887077" y="2563069"/>
             <a:ext cx="161322" cy="1492503"/>
           </a:xfrm>
           <a:prstGeom prst="rect">
@@ -4379,7 +4337,7 @@
         </p:nvCxnSpPr>
         <p:spPr>
           <a:xfrm>
-            <a:off x="10249221" y="2308605"/>
+            <a:off x="9980773" y="1209647"/>
             <a:ext cx="0" cy="2830598"/>
           </a:xfrm>
           <a:prstGeom prst="line">
@@ -4422,7 +4380,7 @@
         </p:nvSpPr>
         <p:spPr>
           <a:xfrm>
-            <a:off x="10173021" y="3485099"/>
+            <a:off x="9904573" y="2386141"/>
             <a:ext cx="152400" cy="1478588"/>
           </a:xfrm>
           <a:prstGeom prst="rect">
@@ -4479,7 +4437,7 @@
         </p:nvCxnSpPr>
         <p:spPr>
           <a:xfrm>
-            <a:off x="8318736" y="3688086"/>
+            <a:off x="8050288" y="2639462"/>
             <a:ext cx="1836137" cy="0"/>
           </a:xfrm>
           <a:prstGeom prst="straightConnector1">
@@ -4523,7 +4481,7 @@
         </p:nvCxnSpPr>
         <p:spPr>
           <a:xfrm>
-            <a:off x="8309828" y="3963228"/>
+            <a:off x="8041380" y="2914604"/>
             <a:ext cx="1863193" cy="0"/>
           </a:xfrm>
           <a:prstGeom prst="straightConnector1">
@@ -4567,7 +4525,7 @@
         </p:nvCxnSpPr>
         <p:spPr>
           <a:xfrm>
-            <a:off x="3121324" y="5094147"/>
+            <a:off x="2852876" y="3995189"/>
             <a:ext cx="5052349" cy="0"/>
           </a:xfrm>
           <a:prstGeom prst="straightConnector1">
@@ -4611,7 +4569,7 @@
         </p:nvSpPr>
         <p:spPr>
           <a:xfrm>
-            <a:off x="8618262" y="3459811"/>
+            <a:off x="8349814" y="2411187"/>
             <a:ext cx="1424846" cy="161583"/>
           </a:xfrm>
           <a:prstGeom prst="rect">
@@ -4669,7 +4627,7 @@
         </p:nvSpPr>
         <p:spPr>
           <a:xfrm>
-            <a:off x="3153276" y="2744554"/>
+            <a:off x="2884828" y="1645596"/>
             <a:ext cx="1424846" cy="923330"/>
           </a:xfrm>
           <a:prstGeom prst="rect">
@@ -4745,7 +4703,7 @@
         </p:nvSpPr>
         <p:spPr>
           <a:xfrm>
-            <a:off x="5808210" y="4863070"/>
+            <a:off x="5539762" y="3764112"/>
             <a:ext cx="621216" cy="215444"/>
           </a:xfrm>
           <a:prstGeom prst="rect">
@@ -4791,7 +4749,7 @@
         </p:nvSpPr>
         <p:spPr>
           <a:xfrm>
-            <a:off x="2068056" y="5146235"/>
+            <a:off x="1799608" y="4047277"/>
             <a:ext cx="762000" cy="215444"/>
           </a:xfrm>
           <a:prstGeom prst="rect">
@@ -4837,7 +4795,7 @@
         </p:nvSpPr>
         <p:spPr>
           <a:xfrm>
-            <a:off x="8488319" y="4554122"/>
+            <a:off x="8219871" y="3455164"/>
             <a:ext cx="1174848" cy="338178"/>
           </a:xfrm>
           <a:prstGeom prst="rect">
@@ -4910,7 +4868,7 @@
         </p:nvSpPr>
         <p:spPr>
           <a:xfrm>
-            <a:off x="8999543" y="4908576"/>
+            <a:off x="8731095" y="3809618"/>
             <a:ext cx="152400" cy="171376"/>
           </a:xfrm>
           <a:prstGeom prst="rect">
@@ -4965,7 +4923,7 @@
         </p:nvCxnSpPr>
         <p:spPr>
           <a:xfrm>
-            <a:off x="8333120" y="4994264"/>
+            <a:off x="8064672" y="3895306"/>
             <a:ext cx="666423" cy="0"/>
           </a:xfrm>
           <a:prstGeom prst="straightConnector1">
@@ -5009,7 +4967,7 @@
         </p:nvSpPr>
         <p:spPr>
           <a:xfrm>
-            <a:off x="5700054" y="2455984"/>
+            <a:off x="5431606" y="1357026"/>
             <a:ext cx="1778201" cy="496860"/>
           </a:xfrm>
           <a:prstGeom prst="rect">
@@ -5098,7 +5056,7 @@
         </p:nvCxnSpPr>
         <p:spPr>
           <a:xfrm>
-            <a:off x="4930664" y="3265347"/>
+            <a:off x="4662216" y="2166389"/>
             <a:ext cx="1597356" cy="1"/>
           </a:xfrm>
           <a:prstGeom prst="straightConnector1">
@@ -5138,7 +5096,7 @@
         </p:nvSpPr>
         <p:spPr>
           <a:xfrm>
-            <a:off x="6528020" y="2960547"/>
+            <a:off x="6259572" y="1861589"/>
             <a:ext cx="205843" cy="123165"/>
           </a:xfrm>
           <a:prstGeom prst="rect">
@@ -5193,7 +5151,7 @@
         </p:nvCxnSpPr>
         <p:spPr>
           <a:xfrm>
-            <a:off x="6630942" y="2960547"/>
+            <a:off x="6362494" y="1861589"/>
             <a:ext cx="0" cy="990600"/>
           </a:xfrm>
           <a:prstGeom prst="line">
@@ -5236,7 +5194,7 @@
         </p:nvSpPr>
         <p:spPr>
           <a:xfrm>
-            <a:off x="6528020" y="3265348"/>
+            <a:off x="6259572" y="2166390"/>
             <a:ext cx="205843" cy="533400"/>
           </a:xfrm>
           <a:prstGeom prst="rect">
@@ -5289,7 +5247,7 @@
         </p:nvCxnSpPr>
         <p:spPr>
           <a:xfrm>
-            <a:off x="4967455" y="3792820"/>
+            <a:off x="4699007" y="2693862"/>
             <a:ext cx="1667219" cy="0"/>
           </a:xfrm>
           <a:prstGeom prst="straightConnector1">
@@ -5333,7 +5291,7 @@
         </p:nvCxnSpPr>
         <p:spPr>
           <a:xfrm>
-            <a:off x="8326073" y="4731837"/>
+            <a:off x="8057625" y="3632879"/>
             <a:ext cx="162246" cy="0"/>
           </a:xfrm>
           <a:prstGeom prst="straightConnector1">
@@ -5373,7 +5331,7 @@
         </p:nvCxnSpPr>
         <p:spPr>
           <a:xfrm>
-            <a:off x="4880498" y="2780751"/>
+            <a:off x="4612050" y="1681793"/>
             <a:ext cx="819556" cy="1"/>
           </a:xfrm>
           <a:prstGeom prst="straightConnector1">
@@ -5415,7 +5373,7 @@
         </p:nvCxnSpPr>
         <p:spPr>
           <a:xfrm>
-            <a:off x="4927592" y="3083712"/>
+            <a:off x="4659144" y="1984754"/>
             <a:ext cx="1600428" cy="0"/>
           </a:xfrm>
           <a:prstGeom prst="straightConnector1">
@@ -5459,7 +5417,7 @@
         </p:nvSpPr>
         <p:spPr>
           <a:xfrm>
-            <a:off x="4853360" y="3276980"/>
+            <a:off x="4584912" y="2178022"/>
             <a:ext cx="1424846" cy="153888"/>
           </a:xfrm>
           <a:prstGeom prst="rect">
@@ -5522,7 +5480,7 @@
         </p:blipFill>
         <p:spPr>
           <a:xfrm>
-            <a:off x="6517022" y="3909602"/>
+            <a:off x="6248574" y="2810644"/>
             <a:ext cx="246400" cy="246400"/>
           </a:xfrm>
           <a:prstGeom prst="rect">
@@ -5544,7 +5502,7 @@
         </p:nvCxnSpPr>
         <p:spPr>
           <a:xfrm>
-            <a:off x="8326073" y="4276073"/>
+            <a:off x="8057625" y="3227449"/>
             <a:ext cx="1836137" cy="0"/>
           </a:xfrm>
           <a:prstGeom prst="straightConnector1">
@@ -5586,7 +5544,7 @@
         </p:nvSpPr>
         <p:spPr>
           <a:xfrm>
-            <a:off x="8622069" y="4046309"/>
+            <a:off x="8353621" y="2997685"/>
             <a:ext cx="1424846" cy="161583"/>
           </a:xfrm>
           <a:prstGeom prst="rect">
@@ -5644,7 +5602,7 @@
         </p:nvSpPr>
         <p:spPr>
           <a:xfrm>
-            <a:off x="8653216" y="3746435"/>
+            <a:off x="8384768" y="2697811"/>
             <a:ext cx="1424846" cy="161583"/>
           </a:xfrm>
           <a:prstGeom prst="rect">
@@ -5701,7 +5659,7 @@
         </p:nvCxnSpPr>
         <p:spPr>
           <a:xfrm>
-            <a:off x="8307467" y="4434951"/>
+            <a:off x="8039019" y="3386327"/>
             <a:ext cx="1865554" cy="0"/>
           </a:xfrm>
           <a:prstGeom prst="straightConnector1">
@@ -5714,6 +5672,49 @@
             <a:prstDash val="sysDash"/>
             <a:headEnd type="arrow" w="med" len="med"/>
             <a:tailEnd type="none" w="med" len="med"/>
+          </a:ln>
+        </p:spPr>
+        <p:style>
+          <a:lnRef idx="1">
+            <a:schemeClr val="accent1"/>
+          </a:lnRef>
+          <a:fillRef idx="0">
+            <a:schemeClr val="accent1"/>
+          </a:fillRef>
+          <a:effectRef idx="0">
+            <a:schemeClr val="accent1"/>
+          </a:effectRef>
+          <a:fontRef idx="minor">
+            <a:schemeClr val="tx1"/>
+          </a:fontRef>
+        </p:style>
+      </p:cxnSp>
+      <p:cxnSp>
+        <p:nvCxnSpPr>
+          <p:cNvPr id="35" name="Connector: Elbow 34">
+            <a:extLst>
+              <a:ext uri="{FF2B5EF4-FFF2-40B4-BE49-F238E27FC236}">
+                <a16:creationId xmlns:a16="http://schemas.microsoft.com/office/drawing/2014/main" id="{EF3EDFA4-6975-4C10-A665-B84F34310CCF}"/>
+              </a:ext>
+            </a:extLst>
+          </p:cNvPr>
+          <p:cNvCxnSpPr>
+            <a:cxnSpLocks/>
+          </p:cNvCxnSpPr>
+          <p:nvPr/>
+        </p:nvCxnSpPr>
+        <p:spPr>
+          <a:xfrm flipV="1">
+            <a:off x="2869811" y="2568441"/>
+            <a:ext cx="5005960" cy="886723"/>
+          </a:xfrm>
+          <a:prstGeom prst="bentConnector3">
+            <a:avLst>
+              <a:gd name="adj1" fmla="val 88721"/>
+            </a:avLst>
+          </a:prstGeom>
+          <a:ln w="19050">
+            <a:tailEnd type="arrow"/>
           </a:ln>
         </p:spPr>
         <p:style>

</xml_diff>